<commit_message>
added sources & XML + preparing solution for development
</commit_message>
<xml_diff>
--- a/Project/doc/Documentatie Sam/Mockups - Designs - Hierarchy/_General - Templates_/lvl_producer_ui_template.pptx
+++ b/Project/doc/Documentatie Sam/Mockups - Designs - Hierarchy/_General - Templates_/lvl_producer_ui_template.pptx
@@ -104,6 +104,11 @@
       </a:defRPr>
     </a:lvl9pPr>
   </p:defaultTextStyle>
+  <p:extLst>
+    <p:ext uri="{EFAFB233-063F-42B5-8137-9DF3F51BA10A}">
+      <p15:sldGuideLst xmlns:p15="http://schemas.microsoft.com/office/powerpoint/2012/main"/>
+    </p:ext>
+  </p:extLst>
 </p:presentation>
 </file>
 
@@ -256,7 +261,7 @@
           <a:p>
             <a:fld id="{CE1695FB-F0E8-4FAE-A24C-33DD78ED6401}" type="datetimeFigureOut">
               <a:rPr lang="nl-BE" smtClean="0"/>
-              <a:t>4/02/2019</a:t>
+              <a:t>5/02/2019</a:t>
             </a:fld>
             <a:endParaRPr lang="nl-BE"/>
           </a:p>
@@ -456,7 +461,7 @@
           <a:p>
             <a:fld id="{CE1695FB-F0E8-4FAE-A24C-33DD78ED6401}" type="datetimeFigureOut">
               <a:rPr lang="nl-BE" smtClean="0"/>
-              <a:t>4/02/2019</a:t>
+              <a:t>5/02/2019</a:t>
             </a:fld>
             <a:endParaRPr lang="nl-BE"/>
           </a:p>
@@ -666,7 +671,7 @@
           <a:p>
             <a:fld id="{CE1695FB-F0E8-4FAE-A24C-33DD78ED6401}" type="datetimeFigureOut">
               <a:rPr lang="nl-BE" smtClean="0"/>
-              <a:t>4/02/2019</a:t>
+              <a:t>5/02/2019</a:t>
             </a:fld>
             <a:endParaRPr lang="nl-BE"/>
           </a:p>
@@ -866,7 +871,7 @@
           <a:p>
             <a:fld id="{CE1695FB-F0E8-4FAE-A24C-33DD78ED6401}" type="datetimeFigureOut">
               <a:rPr lang="nl-BE" smtClean="0"/>
-              <a:t>4/02/2019</a:t>
+              <a:t>5/02/2019</a:t>
             </a:fld>
             <a:endParaRPr lang="nl-BE"/>
           </a:p>
@@ -1142,7 +1147,7 @@
           <a:p>
             <a:fld id="{CE1695FB-F0E8-4FAE-A24C-33DD78ED6401}" type="datetimeFigureOut">
               <a:rPr lang="nl-BE" smtClean="0"/>
-              <a:t>4/02/2019</a:t>
+              <a:t>5/02/2019</a:t>
             </a:fld>
             <a:endParaRPr lang="nl-BE"/>
           </a:p>
@@ -1410,7 +1415,7 @@
           <a:p>
             <a:fld id="{CE1695FB-F0E8-4FAE-A24C-33DD78ED6401}" type="datetimeFigureOut">
               <a:rPr lang="nl-BE" smtClean="0"/>
-              <a:t>4/02/2019</a:t>
+              <a:t>5/02/2019</a:t>
             </a:fld>
             <a:endParaRPr lang="nl-BE"/>
           </a:p>
@@ -1825,7 +1830,7 @@
           <a:p>
             <a:fld id="{CE1695FB-F0E8-4FAE-A24C-33DD78ED6401}" type="datetimeFigureOut">
               <a:rPr lang="nl-BE" smtClean="0"/>
-              <a:t>4/02/2019</a:t>
+              <a:t>5/02/2019</a:t>
             </a:fld>
             <a:endParaRPr lang="nl-BE"/>
           </a:p>
@@ -1967,7 +1972,7 @@
           <a:p>
             <a:fld id="{CE1695FB-F0E8-4FAE-A24C-33DD78ED6401}" type="datetimeFigureOut">
               <a:rPr lang="nl-BE" smtClean="0"/>
-              <a:t>4/02/2019</a:t>
+              <a:t>5/02/2019</a:t>
             </a:fld>
             <a:endParaRPr lang="nl-BE"/>
           </a:p>
@@ -2080,7 +2085,7 @@
           <a:p>
             <a:fld id="{CE1695FB-F0E8-4FAE-A24C-33DD78ED6401}" type="datetimeFigureOut">
               <a:rPr lang="nl-BE" smtClean="0"/>
-              <a:t>4/02/2019</a:t>
+              <a:t>5/02/2019</a:t>
             </a:fld>
             <a:endParaRPr lang="nl-BE"/>
           </a:p>
@@ -2393,7 +2398,7 @@
           <a:p>
             <a:fld id="{CE1695FB-F0E8-4FAE-A24C-33DD78ED6401}" type="datetimeFigureOut">
               <a:rPr lang="nl-BE" smtClean="0"/>
-              <a:t>4/02/2019</a:t>
+              <a:t>5/02/2019</a:t>
             </a:fld>
             <a:endParaRPr lang="nl-BE"/>
           </a:p>
@@ -2682,7 +2687,7 @@
           <a:p>
             <a:fld id="{CE1695FB-F0E8-4FAE-A24C-33DD78ED6401}" type="datetimeFigureOut">
               <a:rPr lang="nl-BE" smtClean="0"/>
-              <a:t>4/02/2019</a:t>
+              <a:t>5/02/2019</a:t>
             </a:fld>
             <a:endParaRPr lang="nl-BE"/>
           </a:p>
@@ -2925,7 +2930,7 @@
           <a:p>
             <a:fld id="{CE1695FB-F0E8-4FAE-A24C-33DD78ED6401}" type="datetimeFigureOut">
               <a:rPr lang="nl-BE" smtClean="0"/>
-              <a:t>4/02/2019</a:t>
+              <a:t>5/02/2019</a:t>
             </a:fld>
             <a:endParaRPr lang="nl-BE"/>
           </a:p>
@@ -3394,10 +3399,10 @@
       </p:sp>
       <p:pic>
         <p:nvPicPr>
-          <p:cNvPr id="5" name="Picture 4">
-            <a:extLst>
-              <a:ext uri="{FF2B5EF4-FFF2-40B4-BE49-F238E27FC236}">
-                <a16:creationId xmlns:a16="http://schemas.microsoft.com/office/drawing/2014/main" id="{66247A09-C144-417E-876E-275EE318FAF2}"/>
+          <p:cNvPr id="13" name="Picture 12">
+            <a:extLst>
+              <a:ext uri="{FF2B5EF4-FFF2-40B4-BE49-F238E27FC236}">
+                <a16:creationId xmlns:a16="http://schemas.microsoft.com/office/drawing/2014/main" id="{2F720B8F-6796-47C9-BFD8-18BDF9919B68}"/>
               </a:ext>
             </a:extLst>
           </p:cNvPr>
@@ -3497,13 +3502,18 @@
           <a:lstStyle/>
           <a:p>
             <a:r>
-              <a:rPr lang="nl-BE" dirty="0">
+              <a:rPr lang="nl-BE">
                 <a:solidFill>
                   <a:schemeClr val="bg1"/>
                 </a:solidFill>
               </a:rPr>
               <a:t>$ 50000</a:t>
             </a:r>
+            <a:endParaRPr lang="nl-BE" dirty="0">
+              <a:solidFill>
+                <a:schemeClr val="bg1"/>
+              </a:solidFill>
+            </a:endParaRPr>
           </a:p>
         </p:txBody>
       </p:sp>

</xml_diff>

<commit_message>
Revert "preparing solution for development of Producer level"
This reverts commit 2aa389f2678ddcad79e531694edf80117313edcf.
</commit_message>
<xml_diff>
--- a/Project/doc/Documentatie Sam/Mockups - Designs - Hierarchy/_General - Templates_/lvl_producer_ui_template.pptx
+++ b/Project/doc/Documentatie Sam/Mockups - Designs - Hierarchy/_General - Templates_/lvl_producer_ui_template.pptx
@@ -104,11 +104,6 @@
       </a:defRPr>
     </a:lvl9pPr>
   </p:defaultTextStyle>
-  <p:extLst>
-    <p:ext uri="{EFAFB233-063F-42B5-8137-9DF3F51BA10A}">
-      <p15:sldGuideLst xmlns:p15="http://schemas.microsoft.com/office/powerpoint/2012/main"/>
-    </p:ext>
-  </p:extLst>
 </p:presentation>
 </file>
 
@@ -261,7 +256,7 @@
           <a:p>
             <a:fld id="{CE1695FB-F0E8-4FAE-A24C-33DD78ED6401}" type="datetimeFigureOut">
               <a:rPr lang="nl-BE" smtClean="0"/>
-              <a:t>5/02/2019</a:t>
+              <a:t>4/02/2019</a:t>
             </a:fld>
             <a:endParaRPr lang="nl-BE"/>
           </a:p>
@@ -461,7 +456,7 @@
           <a:p>
             <a:fld id="{CE1695FB-F0E8-4FAE-A24C-33DD78ED6401}" type="datetimeFigureOut">
               <a:rPr lang="nl-BE" smtClean="0"/>
-              <a:t>5/02/2019</a:t>
+              <a:t>4/02/2019</a:t>
             </a:fld>
             <a:endParaRPr lang="nl-BE"/>
           </a:p>
@@ -671,7 +666,7 @@
           <a:p>
             <a:fld id="{CE1695FB-F0E8-4FAE-A24C-33DD78ED6401}" type="datetimeFigureOut">
               <a:rPr lang="nl-BE" smtClean="0"/>
-              <a:t>5/02/2019</a:t>
+              <a:t>4/02/2019</a:t>
             </a:fld>
             <a:endParaRPr lang="nl-BE"/>
           </a:p>
@@ -871,7 +866,7 @@
           <a:p>
             <a:fld id="{CE1695FB-F0E8-4FAE-A24C-33DD78ED6401}" type="datetimeFigureOut">
               <a:rPr lang="nl-BE" smtClean="0"/>
-              <a:t>5/02/2019</a:t>
+              <a:t>4/02/2019</a:t>
             </a:fld>
             <a:endParaRPr lang="nl-BE"/>
           </a:p>
@@ -1147,7 +1142,7 @@
           <a:p>
             <a:fld id="{CE1695FB-F0E8-4FAE-A24C-33DD78ED6401}" type="datetimeFigureOut">
               <a:rPr lang="nl-BE" smtClean="0"/>
-              <a:t>5/02/2019</a:t>
+              <a:t>4/02/2019</a:t>
             </a:fld>
             <a:endParaRPr lang="nl-BE"/>
           </a:p>
@@ -1415,7 +1410,7 @@
           <a:p>
             <a:fld id="{CE1695FB-F0E8-4FAE-A24C-33DD78ED6401}" type="datetimeFigureOut">
               <a:rPr lang="nl-BE" smtClean="0"/>
-              <a:t>5/02/2019</a:t>
+              <a:t>4/02/2019</a:t>
             </a:fld>
             <a:endParaRPr lang="nl-BE"/>
           </a:p>
@@ -1830,7 +1825,7 @@
           <a:p>
             <a:fld id="{CE1695FB-F0E8-4FAE-A24C-33DD78ED6401}" type="datetimeFigureOut">
               <a:rPr lang="nl-BE" smtClean="0"/>
-              <a:t>5/02/2019</a:t>
+              <a:t>4/02/2019</a:t>
             </a:fld>
             <a:endParaRPr lang="nl-BE"/>
           </a:p>
@@ -1972,7 +1967,7 @@
           <a:p>
             <a:fld id="{CE1695FB-F0E8-4FAE-A24C-33DD78ED6401}" type="datetimeFigureOut">
               <a:rPr lang="nl-BE" smtClean="0"/>
-              <a:t>5/02/2019</a:t>
+              <a:t>4/02/2019</a:t>
             </a:fld>
             <a:endParaRPr lang="nl-BE"/>
           </a:p>
@@ -2085,7 +2080,7 @@
           <a:p>
             <a:fld id="{CE1695FB-F0E8-4FAE-A24C-33DD78ED6401}" type="datetimeFigureOut">
               <a:rPr lang="nl-BE" smtClean="0"/>
-              <a:t>5/02/2019</a:t>
+              <a:t>4/02/2019</a:t>
             </a:fld>
             <a:endParaRPr lang="nl-BE"/>
           </a:p>
@@ -2398,7 +2393,7 @@
           <a:p>
             <a:fld id="{CE1695FB-F0E8-4FAE-A24C-33DD78ED6401}" type="datetimeFigureOut">
               <a:rPr lang="nl-BE" smtClean="0"/>
-              <a:t>5/02/2019</a:t>
+              <a:t>4/02/2019</a:t>
             </a:fld>
             <a:endParaRPr lang="nl-BE"/>
           </a:p>
@@ -2687,7 +2682,7 @@
           <a:p>
             <a:fld id="{CE1695FB-F0E8-4FAE-A24C-33DD78ED6401}" type="datetimeFigureOut">
               <a:rPr lang="nl-BE" smtClean="0"/>
-              <a:t>5/02/2019</a:t>
+              <a:t>4/02/2019</a:t>
             </a:fld>
             <a:endParaRPr lang="nl-BE"/>
           </a:p>
@@ -2930,7 +2925,7 @@
           <a:p>
             <a:fld id="{CE1695FB-F0E8-4FAE-A24C-33DD78ED6401}" type="datetimeFigureOut">
               <a:rPr lang="nl-BE" smtClean="0"/>
-              <a:t>5/02/2019</a:t>
+              <a:t>4/02/2019</a:t>
             </a:fld>
             <a:endParaRPr lang="nl-BE"/>
           </a:p>
@@ -3399,10 +3394,10 @@
       </p:sp>
       <p:pic>
         <p:nvPicPr>
-          <p:cNvPr id="13" name="Picture 12">
-            <a:extLst>
-              <a:ext uri="{FF2B5EF4-FFF2-40B4-BE49-F238E27FC236}">
-                <a16:creationId xmlns:a16="http://schemas.microsoft.com/office/drawing/2014/main" id="{2F720B8F-6796-47C9-BFD8-18BDF9919B68}"/>
+          <p:cNvPr id="5" name="Picture 4">
+            <a:extLst>
+              <a:ext uri="{FF2B5EF4-FFF2-40B4-BE49-F238E27FC236}">
+                <a16:creationId xmlns:a16="http://schemas.microsoft.com/office/drawing/2014/main" id="{66247A09-C144-417E-876E-275EE318FAF2}"/>
               </a:ext>
             </a:extLst>
           </p:cNvPr>
@@ -3502,18 +3497,13 @@
           <a:lstStyle/>
           <a:p>
             <a:r>
-              <a:rPr lang="nl-BE">
+              <a:rPr lang="nl-BE" dirty="0">
                 <a:solidFill>
                   <a:schemeClr val="bg1"/>
                 </a:solidFill>
               </a:rPr>
               <a:t>$ 50000</a:t>
             </a:r>
-            <a:endParaRPr lang="nl-BE" dirty="0">
-              <a:solidFill>
-                <a:schemeClr val="bg1"/>
-              </a:solidFill>
-            </a:endParaRPr>
           </a:p>
         </p:txBody>
       </p:sp>

</xml_diff>